<commit_message>
fix URL to change google password
</commit_message>
<xml_diff>
--- a/events/2021-09-15/slides/02-security.pptx
+++ b/events/2021-09-15/slides/02-security.pptx
@@ -253,7 +253,7 @@
             <a:fld id="{35305EB0-020F-4995-961E-A35B2BB78D2B}" type="datetimeFigureOut">
               <a:rPr kumimoji="1" lang="ja-JP" altLang="en-US" smtClean="0"/>
               <a:pPr/>
-              <a:t>2021/9/15</a:t>
+              <a:t>2021/9/17</a:t>
             </a:fld>
             <a:endParaRPr kumimoji="1" lang="ja-JP" altLang="en-US"/>
           </a:p>
@@ -57493,7 +57493,7 @@
             <p:ph idx="1"/>
             <p:extLst>
               <p:ext uri="{D42A27DB-BD31-4B8C-83A1-F6EECF244321}">
-                <p14:modId xmlns:p14="http://schemas.microsoft.com/office/powerpoint/2010/main" val="2693585583"/>
+                <p14:modId xmlns:p14="http://schemas.microsoft.com/office/powerpoint/2010/main" val="3424028086"/>
               </p:ext>
             </p:extLst>
           </p:nvPr>
@@ -57705,9 +57705,15 @@
                         <a:rPr kumimoji="1" lang="en-US" altLang="ja-JP" dirty="0">
                           <a:hlinkClick r:id="rId5"/>
                         </a:rPr>
-                        <a:t>https://idm.ecc.u-tokyo.ac.jp/webmtn/sso-saml</a:t>
+                        <a:t>https://idm.ecc.u-tokyo.ac.jp/</a:t>
                       </a:r>
-                      <a:endParaRPr kumimoji="1" lang="en-US" altLang="ja-JP" dirty="0"/>
+                      <a:r>
+                        <a:rPr kumimoji="1" lang="en-US" altLang="ja-JP">
+                          <a:hlinkClick r:id="rId5"/>
+                        </a:rPr>
+                        <a:t>webmtn/</a:t>
+                      </a:r>
+                      <a:endParaRPr kumimoji="1" lang="en-US" altLang="ja-JP"/>
                     </a:p>
                   </a:txBody>
                   <a:tcPr/>

</xml_diff>

<commit_message>
fix links to utokyo microsoft excel
</commit_message>
<xml_diff>
--- a/events/2021-09-15/slides/02-security.pptx
+++ b/events/2021-09-15/slides/02-security.pptx
@@ -5,7 +5,7 @@
     <p:sldMasterId id="2147483660" r:id="rId1"/>
   </p:sldMasterIdLst>
   <p:notesMasterIdLst>
-    <p:notesMasterId r:id="rId14"/>
+    <p:notesMasterId r:id="rId15"/>
   </p:notesMasterIdLst>
   <p:sldIdLst>
     <p:sldId id="256" r:id="rId2"/>
@@ -18,8 +18,9 @@
     <p:sldId id="1289" r:id="rId9"/>
     <p:sldId id="1288" r:id="rId10"/>
     <p:sldId id="1286" r:id="rId11"/>
-    <p:sldId id="1290" r:id="rId12"/>
-    <p:sldId id="1284" r:id="rId13"/>
+    <p:sldId id="1292" r:id="rId12"/>
+    <p:sldId id="1290" r:id="rId13"/>
+    <p:sldId id="1284" r:id="rId14"/>
   </p:sldIdLst>
   <p:sldSz cx="9144000" cy="6858000" type="screen4x3"/>
   <p:notesSz cx="6858000" cy="9144000"/>
@@ -253,7 +254,7 @@
             <a:fld id="{35305EB0-020F-4995-961E-A35B2BB78D2B}" type="datetimeFigureOut">
               <a:rPr kumimoji="1" lang="ja-JP" altLang="en-US" smtClean="0"/>
               <a:pPr/>
-              <a:t>2021/9/17</a:t>
+              <a:t>2021/9/28</a:t>
             </a:fld>
             <a:endParaRPr kumimoji="1" lang="ja-JP" altLang="en-US"/>
           </a:p>
@@ -626,6 +627,91 @@
     <p:extLst>
       <p:ext uri="{BB962C8B-B14F-4D97-AF65-F5344CB8AC3E}">
         <p14:creationId xmlns:p14="http://schemas.microsoft.com/office/powerpoint/2010/main" val="3427348667"/>
+      </p:ext>
+    </p:extLst>
+  </p:cSld>
+  <p:clrMapOvr>
+    <a:masterClrMapping/>
+  </p:clrMapOvr>
+</p:notes>
+</file>
+
+<file path=ppt/notesSlides/notesSlide2.xml><?xml version="1.0" encoding="utf-8"?>
+<p:notes xmlns:a="http://schemas.openxmlformats.org/drawingml/2006/main" xmlns:r="http://schemas.openxmlformats.org/officeDocument/2006/relationships" xmlns:p="http://schemas.openxmlformats.org/presentationml/2006/main">
+  <p:cSld>
+    <p:spTree>
+      <p:nvGrpSpPr>
+        <p:cNvPr id="1" name=""/>
+        <p:cNvGrpSpPr/>
+        <p:nvPr/>
+      </p:nvGrpSpPr>
+      <p:grpSpPr>
+        <a:xfrm>
+          <a:off x="0" y="0"/>
+          <a:ext cx="0" cy="0"/>
+          <a:chOff x="0" y="0"/>
+          <a:chExt cx="0" cy="0"/>
+        </a:xfrm>
+      </p:grpSpPr>
+      <p:sp>
+        <p:nvSpPr>
+          <p:cNvPr id="2" name="スライド イメージ プレースホルダー 1"/>
+          <p:cNvSpPr>
+            <a:spLocks noGrp="1" noRot="1" noChangeAspect="1"/>
+          </p:cNvSpPr>
+          <p:nvPr>
+            <p:ph type="sldImg"/>
+          </p:nvPr>
+        </p:nvSpPr>
+        <p:spPr/>
+      </p:sp>
+      <p:sp>
+        <p:nvSpPr>
+          <p:cNvPr id="3" name="ノート プレースホルダー 2"/>
+          <p:cNvSpPr>
+            <a:spLocks noGrp="1"/>
+          </p:cNvSpPr>
+          <p:nvPr>
+            <p:ph type="body" idx="1"/>
+          </p:nvPr>
+        </p:nvSpPr>
+        <p:spPr/>
+        <p:txBody>
+          <a:bodyPr/>
+          <a:lstStyle/>
+          <a:p>
+            <a:endParaRPr kumimoji="1" lang="ja-JP" altLang="en-US" dirty="0"/>
+          </a:p>
+        </p:txBody>
+      </p:sp>
+      <p:sp>
+        <p:nvSpPr>
+          <p:cNvPr id="4" name="スライド番号プレースホルダー 3"/>
+          <p:cNvSpPr>
+            <a:spLocks noGrp="1"/>
+          </p:cNvSpPr>
+          <p:nvPr>
+            <p:ph type="sldNum" sz="quarter" idx="5"/>
+          </p:nvPr>
+        </p:nvSpPr>
+        <p:spPr/>
+        <p:txBody>
+          <a:bodyPr/>
+          <a:lstStyle/>
+          <a:p>
+            <a:fld id="{FD842DED-4B9B-4568-AC85-B50FA0785511}" type="slidenum">
+              <a:rPr kumimoji="1" lang="ja-JP" altLang="en-US" smtClean="0"/>
+              <a:pPr/>
+              <a:t>10</a:t>
+            </a:fld>
+            <a:endParaRPr kumimoji="1" lang="ja-JP" altLang="en-US"/>
+          </a:p>
+        </p:txBody>
+      </p:sp>
+    </p:spTree>
+    <p:extLst>
+      <p:ext uri="{BB962C8B-B14F-4D97-AF65-F5344CB8AC3E}">
+        <p14:creationId xmlns:p14="http://schemas.microsoft.com/office/powerpoint/2010/main" val="1821034084"/>
       </p:ext>
     </p:extLst>
   </p:cSld>
@@ -52709,61 +52795,61 @@
           </a:p>
           <a:p>
             <a:r>
-              <a:rPr lang="ja-JP" altLang="en-US" dirty="0"/>
+              <a:rPr lang="ja-JP" altLang="en-US" strike="sngStrike" dirty="0"/>
               <a:t>目的に照らすと、取り消しを自動で認めることはできず、改めての「本人確認」が必要</a:t>
             </a:r>
-            <a:endParaRPr lang="en-US" altLang="ja-JP" dirty="0"/>
+            <a:endParaRPr lang="en-US" altLang="ja-JP" strike="sngStrike" dirty="0"/>
           </a:p>
           <a:p>
             <a:r>
-              <a:rPr lang="ja-JP" altLang="en-US" dirty="0"/>
+              <a:rPr lang="ja-JP" altLang="en-US" strike="sngStrike" dirty="0"/>
               <a:t>ご本人</a:t>
             </a:r>
             <a:r>
-              <a:rPr lang="ja-JP" altLang="en-US" dirty="0">
+              <a:rPr lang="ja-JP" altLang="en-US" strike="sngStrike" dirty="0">
                 <a:sym typeface="Symbol" panose="05050102010706020507" pitchFamily="18" charset="2"/>
               </a:rPr>
               <a:t></a:t>
             </a:r>
             <a:r>
-              <a:rPr lang="ja-JP" altLang="en-US" dirty="0"/>
+              <a:rPr lang="ja-JP" altLang="en-US" strike="sngStrike" dirty="0"/>
               <a:t> 事務 </a:t>
             </a:r>
             <a:r>
-              <a:rPr lang="ja-JP" altLang="en-US" dirty="0">
+              <a:rPr lang="ja-JP" altLang="en-US" strike="sngStrike" dirty="0">
                 <a:sym typeface="Symbol" panose="05050102010706020507" pitchFamily="18" charset="2"/>
               </a:rPr>
               <a:t> </a:t>
             </a:r>
             <a:r>
-              <a:rPr lang="en-US" altLang="ja-JP" dirty="0" err="1"/>
+              <a:rPr lang="en-US" altLang="ja-JP" strike="sngStrike" dirty="0" err="1"/>
               <a:t>utelecon</a:t>
             </a:r>
             <a:r>
-              <a:rPr lang="ja-JP" altLang="en-US" dirty="0"/>
+              <a:rPr lang="ja-JP" altLang="en-US" strike="sngStrike" dirty="0"/>
               <a:t>という経路で取り消しを受け付けます</a:t>
             </a:r>
-            <a:endParaRPr lang="en-US" altLang="ja-JP" dirty="0"/>
+            <a:endParaRPr lang="en-US" altLang="ja-JP" strike="sngStrike" dirty="0"/>
           </a:p>
           <a:p>
             <a:pPr lvl="1"/>
             <a:r>
-              <a:rPr lang="ja-JP" altLang="en-US" dirty="0"/>
+              <a:rPr lang="ja-JP" altLang="en-US" strike="sngStrike" dirty="0"/>
               <a:t>専攻事務の皆様のご協力（取次ぎ）をお願いいたします</a:t>
             </a:r>
-            <a:endParaRPr lang="en-US" altLang="ja-JP" dirty="0"/>
+            <a:endParaRPr lang="en-US" altLang="ja-JP" strike="sngStrike" dirty="0"/>
           </a:p>
           <a:p>
             <a:pPr lvl="1"/>
             <a:r>
-              <a:rPr lang="en-US" altLang="ja-JP" dirty="0"/>
+              <a:rPr lang="en-US" altLang="ja-JP" strike="sngStrike" dirty="0"/>
               <a:t>UTokyo Account</a:t>
             </a:r>
             <a:r>
-              <a:rPr lang="ja-JP" altLang="en-US" dirty="0"/>
+              <a:rPr lang="ja-JP" altLang="en-US" strike="sngStrike" dirty="0"/>
               <a:t>のパスワードリセットと同じ</a:t>
             </a:r>
-            <a:endParaRPr lang="en-US" altLang="ja-JP" dirty="0"/>
+            <a:endParaRPr lang="en-US" altLang="ja-JP" strike="sngStrike" dirty="0"/>
           </a:p>
         </p:txBody>
       </p:sp>
@@ -52863,6 +52949,82 @@
           </a:p>
         </p:txBody>
       </p:sp>
+      <p:sp>
+        <p:nvSpPr>
+          <p:cNvPr id="7" name="正方形/長方形 6">
+            <a:extLst>
+              <a:ext uri="{FF2B5EF4-FFF2-40B4-BE49-F238E27FC236}">
+                <a16:creationId xmlns:a16="http://schemas.microsoft.com/office/drawing/2014/main" id="{76E2C88F-05FA-45A2-916E-91F8E01D535A}"/>
+              </a:ext>
+            </a:extLst>
+          </p:cNvPr>
+          <p:cNvSpPr/>
+          <p:nvPr/>
+        </p:nvSpPr>
+        <p:spPr>
+          <a:xfrm>
+            <a:off x="4572000" y="1349896"/>
+            <a:ext cx="4392488" cy="1143000"/>
+          </a:xfrm>
+          <a:prstGeom prst="rect">
+            <a:avLst/>
+          </a:prstGeom>
+          <a:solidFill>
+            <a:srgbClr val="FFFF00"/>
+          </a:solidFill>
+        </p:spPr>
+        <p:style>
+          <a:lnRef idx="2">
+            <a:schemeClr val="accent1">
+              <a:shade val="50000"/>
+            </a:schemeClr>
+          </a:lnRef>
+          <a:fillRef idx="1">
+            <a:schemeClr val="accent1"/>
+          </a:fillRef>
+          <a:effectRef idx="0">
+            <a:schemeClr val="accent1"/>
+          </a:effectRef>
+          <a:fontRef idx="minor">
+            <a:schemeClr val="lt1"/>
+          </a:fontRef>
+        </p:style>
+        <p:txBody>
+          <a:bodyPr rtlCol="0" anchor="ctr"/>
+          <a:lstStyle/>
+          <a:p>
+            <a:r>
+              <a:rPr kumimoji="1" lang="en-US" altLang="ja-JP" dirty="0">
+                <a:solidFill>
+                  <a:srgbClr val="FF0000"/>
+                </a:solidFill>
+              </a:rPr>
+              <a:t>9/28 </a:t>
+            </a:r>
+            <a:r>
+              <a:rPr kumimoji="1" lang="ja-JP" altLang="en-US" dirty="0">
+                <a:solidFill>
+                  <a:srgbClr val="FF0000"/>
+                </a:solidFill>
+              </a:rPr>
+              <a:t>修正    トラブル時の対応を迅速に行うために以下のやり方を（当分）改めます</a:t>
+            </a:r>
+            <a:r>
+              <a:rPr lang="ja-JP" altLang="en-US" dirty="0">
+                <a:solidFill>
+                  <a:srgbClr val="FF0000"/>
+                </a:solidFill>
+              </a:rPr>
+              <a:t>（次ページ）</a:t>
+            </a:r>
+            <a:endParaRPr kumimoji="1" lang="ja-JP" altLang="en-US" dirty="0">
+              <a:solidFill>
+                <a:srgbClr val="FF0000"/>
+              </a:solidFill>
+            </a:endParaRPr>
+          </a:p>
+        </p:txBody>
+      </p:sp>
     </p:spTree>
     <p:extLst>
       <p:ext uri="{BB962C8B-B14F-4D97-AF65-F5344CB8AC3E}">
@@ -52877,6 +53039,247 @@
 </file>
 
 <file path=ppt/slides/slide11.xml><?xml version="1.0" encoding="utf-8"?>
+<p:sld xmlns:a="http://schemas.openxmlformats.org/drawingml/2006/main" xmlns:r="http://schemas.openxmlformats.org/officeDocument/2006/relationships" xmlns:p="http://schemas.openxmlformats.org/presentationml/2006/main">
+  <p:cSld>
+    <p:spTree>
+      <p:nvGrpSpPr>
+        <p:cNvPr id="1" name=""/>
+        <p:cNvGrpSpPr/>
+        <p:nvPr/>
+      </p:nvGrpSpPr>
+      <p:grpSpPr>
+        <a:xfrm>
+          <a:off x="0" y="0"/>
+          <a:ext cx="0" cy="0"/>
+          <a:chOff x="0" y="0"/>
+          <a:chExt cx="0" cy="0"/>
+        </a:xfrm>
+      </p:grpSpPr>
+      <p:sp>
+        <p:nvSpPr>
+          <p:cNvPr id="2" name="タイトル 1">
+            <a:extLst>
+              <a:ext uri="{FF2B5EF4-FFF2-40B4-BE49-F238E27FC236}">
+                <a16:creationId xmlns:a16="http://schemas.microsoft.com/office/drawing/2014/main" id="{A5DAF1F3-7A4F-44A1-AC7E-0CD9A2D524AF}"/>
+              </a:ext>
+            </a:extLst>
+          </p:cNvPr>
+          <p:cNvSpPr>
+            <a:spLocks noGrp="1"/>
+          </p:cNvSpPr>
+          <p:nvPr>
+            <p:ph type="title"/>
+          </p:nvPr>
+        </p:nvSpPr>
+        <p:spPr/>
+        <p:txBody>
+          <a:bodyPr/>
+          <a:lstStyle/>
+          <a:p>
+            <a:r>
+              <a:rPr lang="ja-JP" altLang="en-US" dirty="0"/>
+              <a:t>取り消し方法</a:t>
+            </a:r>
+            <a:endParaRPr kumimoji="1" lang="ja-JP" altLang="en-US" dirty="0"/>
+          </a:p>
+        </p:txBody>
+      </p:sp>
+      <p:sp>
+        <p:nvSpPr>
+          <p:cNvPr id="3" name="コンテンツ プレースホルダー 2">
+            <a:extLst>
+              <a:ext uri="{FF2B5EF4-FFF2-40B4-BE49-F238E27FC236}">
+                <a16:creationId xmlns:a16="http://schemas.microsoft.com/office/drawing/2014/main" id="{33B9FD86-B0C8-4038-A29E-93B77F2C9E4F}"/>
+              </a:ext>
+            </a:extLst>
+          </p:cNvPr>
+          <p:cNvSpPr>
+            <a:spLocks noGrp="1"/>
+          </p:cNvSpPr>
+          <p:nvPr>
+            <p:ph idx="1"/>
+          </p:nvPr>
+        </p:nvSpPr>
+        <p:spPr/>
+        <p:txBody>
+          <a:bodyPr>
+            <a:normAutofit lnSpcReduction="10000"/>
+          </a:bodyPr>
+          <a:lstStyle/>
+          <a:p>
+            <a:r>
+              <a:rPr lang="ja-JP" altLang="en-US" dirty="0"/>
+              <a:t>基本は取り消さない</a:t>
+            </a:r>
+            <a:endParaRPr lang="en-US" altLang="ja-JP" dirty="0"/>
+          </a:p>
+          <a:p>
+            <a:r>
+              <a:rPr lang="ja-JP" altLang="en-US" dirty="0"/>
+              <a:t>トラブルが生じるなど取り消しが必要な場合、通常の</a:t>
+            </a:r>
+            <a:r>
+              <a:rPr lang="en-US" altLang="ja-JP" dirty="0" err="1"/>
+              <a:t>utelecon</a:t>
+            </a:r>
+            <a:r>
+              <a:rPr lang="ja-JP" altLang="en-US" dirty="0"/>
+              <a:t>サポート窓口 </a:t>
+            </a:r>
+            <a:r>
+              <a:rPr lang="en-US" altLang="ja-JP" dirty="0">
+                <a:hlinkClick r:id="rId2"/>
+              </a:rPr>
+              <a:t>https://utelecon.adm.u-tokyo.ac.jp/support/</a:t>
+            </a:r>
+            <a:r>
+              <a:rPr lang="en-US" altLang="ja-JP" dirty="0"/>
+              <a:t> </a:t>
+            </a:r>
+            <a:r>
+              <a:rPr lang="ja-JP" altLang="en-US" dirty="0"/>
+              <a:t>メールフォームからお申し込みください</a:t>
+            </a:r>
+            <a:endParaRPr lang="en-US" altLang="ja-JP" dirty="0"/>
+          </a:p>
+          <a:p>
+            <a:r>
+              <a:rPr lang="en-US" altLang="ja-JP" dirty="0"/>
+              <a:t>UTokyo Account</a:t>
+            </a:r>
+            <a:r>
+              <a:rPr lang="ja-JP" altLang="en-US" dirty="0"/>
+              <a:t>をご記入ください</a:t>
+            </a:r>
+            <a:endParaRPr lang="en-US" altLang="ja-JP" dirty="0"/>
+          </a:p>
+          <a:p>
+            <a:r>
+              <a:rPr lang="ja-JP" altLang="en-US" dirty="0"/>
+              <a:t>リセットをする場合でも、トラブルの</a:t>
+            </a:r>
+            <a:r>
+              <a:rPr lang="ja-JP" altLang="en-US"/>
+              <a:t>症状を記入</a:t>
+            </a:r>
+            <a:r>
+              <a:rPr lang="ja-JP" altLang="en-US" dirty="0"/>
+              <a:t>いただけると幸いです</a:t>
+            </a:r>
+            <a:endParaRPr lang="en-US" altLang="ja-JP" dirty="0"/>
+          </a:p>
+        </p:txBody>
+      </p:sp>
+      <p:sp>
+        <p:nvSpPr>
+          <p:cNvPr id="4" name="日付プレースホルダー 3">
+            <a:extLst>
+              <a:ext uri="{FF2B5EF4-FFF2-40B4-BE49-F238E27FC236}">
+                <a16:creationId xmlns:a16="http://schemas.microsoft.com/office/drawing/2014/main" id="{5ACACDF0-8057-4701-8AAB-61B30B4A0003}"/>
+              </a:ext>
+            </a:extLst>
+          </p:cNvPr>
+          <p:cNvSpPr>
+            <a:spLocks noGrp="1"/>
+          </p:cNvSpPr>
+          <p:nvPr>
+            <p:ph type="dt" sz="half" idx="10"/>
+          </p:nvPr>
+        </p:nvSpPr>
+        <p:spPr/>
+        <p:txBody>
+          <a:bodyPr/>
+          <a:lstStyle/>
+          <a:p>
+            <a:r>
+              <a:rPr kumimoji="1" lang="en-US" altLang="ja-JP"/>
+              <a:t>2021/9/15</a:t>
+            </a:r>
+            <a:endParaRPr kumimoji="1" lang="ja-JP" altLang="en-US"/>
+          </a:p>
+        </p:txBody>
+      </p:sp>
+      <p:sp>
+        <p:nvSpPr>
+          <p:cNvPr id="5" name="フッター プレースホルダー 4">
+            <a:extLst>
+              <a:ext uri="{FF2B5EF4-FFF2-40B4-BE49-F238E27FC236}">
+                <a16:creationId xmlns:a16="http://schemas.microsoft.com/office/drawing/2014/main" id="{AE089F74-1FEF-4611-BCB0-2C5453FF3F4B}"/>
+              </a:ext>
+            </a:extLst>
+          </p:cNvPr>
+          <p:cNvSpPr>
+            <a:spLocks noGrp="1"/>
+          </p:cNvSpPr>
+          <p:nvPr>
+            <p:ph type="ftr" sz="quarter" idx="11"/>
+          </p:nvPr>
+        </p:nvSpPr>
+        <p:spPr/>
+        <p:txBody>
+          <a:bodyPr/>
+          <a:lstStyle/>
+          <a:p>
+            <a:r>
+              <a:rPr kumimoji="1" lang="en-US" altLang="ja-JP"/>
+              <a:t>2021A</a:t>
+            </a:r>
+            <a:r>
+              <a:rPr kumimoji="1" lang="ja-JP" altLang="en-US"/>
+              <a:t>セメスタ説明会 </a:t>
+            </a:r>
+            <a:r>
+              <a:rPr kumimoji="1" lang="en-US" altLang="ja-JP"/>
+              <a:t>https://utelecon.adm.u-tokyo.ac.jp/</a:t>
+            </a:r>
+            <a:endParaRPr kumimoji="1" lang="ja-JP" altLang="en-US" dirty="0"/>
+          </a:p>
+        </p:txBody>
+      </p:sp>
+      <p:sp>
+        <p:nvSpPr>
+          <p:cNvPr id="6" name="スライド番号プレースホルダー 5">
+            <a:extLst>
+              <a:ext uri="{FF2B5EF4-FFF2-40B4-BE49-F238E27FC236}">
+                <a16:creationId xmlns:a16="http://schemas.microsoft.com/office/drawing/2014/main" id="{781A5183-EF6B-4AC8-BBAD-20235471BE30}"/>
+              </a:ext>
+            </a:extLst>
+          </p:cNvPr>
+          <p:cNvSpPr>
+            <a:spLocks noGrp="1"/>
+          </p:cNvSpPr>
+          <p:nvPr>
+            <p:ph type="sldNum" sz="quarter" idx="12"/>
+          </p:nvPr>
+        </p:nvSpPr>
+        <p:spPr/>
+        <p:txBody>
+          <a:bodyPr/>
+          <a:lstStyle/>
+          <a:p>
+            <a:fld id="{EDF77D8D-9987-453A-9A05-EB91CA595C68}" type="slidenum">
+              <a:rPr kumimoji="1" lang="ja-JP" altLang="en-US" smtClean="0"/>
+              <a:pPr/>
+              <a:t>11</a:t>
+            </a:fld>
+            <a:endParaRPr kumimoji="1" lang="ja-JP" altLang="en-US"/>
+          </a:p>
+        </p:txBody>
+      </p:sp>
+    </p:spTree>
+    <p:extLst>
+      <p:ext uri="{BB962C8B-B14F-4D97-AF65-F5344CB8AC3E}">
+        <p14:creationId xmlns:p14="http://schemas.microsoft.com/office/powerpoint/2010/main" val="3652114238"/>
+      </p:ext>
+    </p:extLst>
+  </p:cSld>
+  <p:clrMapOvr>
+    <a:masterClrMapping/>
+  </p:clrMapOvr>
+</p:sld>
+</file>
+
+<file path=ppt/slides/slide12.xml><?xml version="1.0" encoding="utf-8"?>
 <p:sld xmlns:a="http://schemas.openxmlformats.org/drawingml/2006/main" xmlns:r="http://schemas.openxmlformats.org/officeDocument/2006/relationships" xmlns:p="http://schemas.openxmlformats.org/presentationml/2006/main">
   <p:cSld>
     <p:spTree>
@@ -53011,7 +53414,7 @@
             <a:fld id="{EDF77D8D-9987-453A-9A05-EB91CA595C68}" type="slidenum">
               <a:rPr kumimoji="1" lang="ja-JP" altLang="en-US" smtClean="0"/>
               <a:pPr/>
-              <a:t>11</a:t>
+              <a:t>12</a:t>
             </a:fld>
             <a:endParaRPr kumimoji="1" lang="ja-JP" altLang="en-US"/>
           </a:p>
@@ -53855,7 +54258,7 @@
 </p:sld>
 </file>
 
-<file path=ppt/slides/slide12.xml><?xml version="1.0" encoding="utf-8"?>
+<file path=ppt/slides/slide13.xml><?xml version="1.0" encoding="utf-8"?>
 <p:sld xmlns:a="http://schemas.openxmlformats.org/drawingml/2006/main" xmlns:r="http://schemas.openxmlformats.org/officeDocument/2006/relationships" xmlns:p="http://schemas.openxmlformats.org/presentationml/2006/main">
   <p:cSld>
     <p:spTree>
@@ -54080,7 +54483,7 @@
             <a:fld id="{EDF77D8D-9987-453A-9A05-EB91CA595C68}" type="slidenum">
               <a:rPr kumimoji="1" lang="ja-JP" altLang="en-US" smtClean="0"/>
               <a:pPr/>
-              <a:t>12</a:t>
+              <a:t>13</a:t>
             </a:fld>
             <a:endParaRPr kumimoji="1" lang="ja-JP" altLang="en-US"/>
           </a:p>

</xml_diff>